<commit_message>
Powerpoint update Updated Powerpoint presentation to mirror Latex version more closely.
</commit_message>
<xml_diff>
--- a/doc/Reports/01 - Initial Report/03 - Presentation/Presentation.pptx
+++ b/doc/Reports/01 - Initial Report/03 - Presentation/Presentation.pptx
@@ -5,16 +5,18 @@
     <p:sldMasterId id="2147483648" r:id="rId1"/>
   </p:sldMasterIdLst>
   <p:notesMasterIdLst>
-    <p:notesMasterId r:id="rId6"/>
+    <p:notesMasterId r:id="rId8"/>
   </p:notesMasterIdLst>
   <p:handoutMasterIdLst>
-    <p:handoutMasterId r:id="rId7"/>
+    <p:handoutMasterId r:id="rId9"/>
   </p:handoutMasterIdLst>
   <p:sldIdLst>
     <p:sldId id="256" r:id="rId2"/>
     <p:sldId id="257" r:id="rId3"/>
     <p:sldId id="258" r:id="rId4"/>
     <p:sldId id="259" r:id="rId5"/>
+    <p:sldId id="261" r:id="rId6"/>
+    <p:sldId id="260" r:id="rId7"/>
   </p:sldIdLst>
   <p:sldSz cx="9144000" cy="6858000" type="screen4x3"/>
   <p:notesSz cx="6858000" cy="9144000"/>
@@ -198,7 +200,8 @@
           <a:p>
             <a:fld id="{C915CE06-1327-284A-973C-DDBECD64A7BD}" type="datetimeFigureOut">
               <a:rPr lang="en-US" smtClean="0"/>
-              <a:t>2/7/15</a:t>
+              <a:pPr/>
+              <a:t>2/8/15</a:t>
             </a:fld>
             <a:endParaRPr lang="en-US"/>
           </a:p>
@@ -264,6 +267,7 @@
           <a:p>
             <a:fld id="{B86E4CAB-2820-8943-8333-34E013F512CF}" type="slidenum">
               <a:rPr lang="en-US" smtClean="0"/>
+              <a:pPr/>
               <a:t>‹#›</a:t>
             </a:fld>
             <a:endParaRPr lang="en-US"/>
@@ -358,7 +362,8 @@
           <a:p>
             <a:fld id="{CFC692C7-4D07-8248-AC5B-6265A7FD0688}" type="datetimeFigureOut">
               <a:rPr lang="en-US" smtClean="0"/>
-              <a:t>2/7/15</a:t>
+              <a:pPr/>
+              <a:t>2/8/15</a:t>
             </a:fld>
             <a:endParaRPr lang="en-US"/>
           </a:p>
@@ -519,6 +524,7 @@
           <a:p>
             <a:fld id="{80034BB4-3B0E-BB4D-9FC3-31F9A407B298}" type="slidenum">
               <a:rPr lang="en-US" smtClean="0"/>
+              <a:pPr/>
               <a:t>‹#›</a:t>
             </a:fld>
             <a:endParaRPr lang="en-US"/>
@@ -804,7 +810,8 @@
           <a:p>
             <a:fld id="{71169BC0-758F-CD4F-A1C3-AB88916542BF}" type="datetimeFigureOut">
               <a:rPr lang="en-US" smtClean="0"/>
-              <a:t>2/7/15</a:t>
+              <a:pPr/>
+              <a:t>2/8/15</a:t>
             </a:fld>
             <a:endParaRPr lang="en-US"/>
           </a:p>
@@ -846,6 +853,7 @@
           <a:p>
             <a:fld id="{30F0A286-0EF2-B54B-B349-D21AC9C8E548}" type="slidenum">
               <a:rPr lang="en-US" smtClean="0"/>
+              <a:pPr/>
               <a:t>‹#›</a:t>
             </a:fld>
             <a:endParaRPr lang="en-US"/>
@@ -969,7 +977,8 @@
           <a:p>
             <a:fld id="{71169BC0-758F-CD4F-A1C3-AB88916542BF}" type="datetimeFigureOut">
               <a:rPr lang="en-US" smtClean="0"/>
-              <a:t>2/7/15</a:t>
+              <a:pPr/>
+              <a:t>2/8/15</a:t>
             </a:fld>
             <a:endParaRPr lang="en-US"/>
           </a:p>
@@ -1011,6 +1020,7 @@
           <a:p>
             <a:fld id="{30F0A286-0EF2-B54B-B349-D21AC9C8E548}" type="slidenum">
               <a:rPr lang="en-US" smtClean="0"/>
+              <a:pPr/>
               <a:t>‹#›</a:t>
             </a:fld>
             <a:endParaRPr lang="en-US"/>
@@ -1144,7 +1154,8 @@
           <a:p>
             <a:fld id="{71169BC0-758F-CD4F-A1C3-AB88916542BF}" type="datetimeFigureOut">
               <a:rPr lang="en-US" smtClean="0"/>
-              <a:t>2/7/15</a:t>
+              <a:pPr/>
+              <a:t>2/8/15</a:t>
             </a:fld>
             <a:endParaRPr lang="en-US"/>
           </a:p>
@@ -1186,6 +1197,7 @@
           <a:p>
             <a:fld id="{30F0A286-0EF2-B54B-B349-D21AC9C8E548}" type="slidenum">
               <a:rPr lang="en-US" smtClean="0"/>
+              <a:pPr/>
               <a:t>‹#›</a:t>
             </a:fld>
             <a:endParaRPr lang="en-US"/>
@@ -1309,7 +1321,8 @@
           <a:p>
             <a:fld id="{71169BC0-758F-CD4F-A1C3-AB88916542BF}" type="datetimeFigureOut">
               <a:rPr lang="en-US" smtClean="0"/>
-              <a:t>2/7/15</a:t>
+              <a:pPr/>
+              <a:t>2/8/15</a:t>
             </a:fld>
             <a:endParaRPr lang="en-US"/>
           </a:p>
@@ -1351,6 +1364,7 @@
           <a:p>
             <a:fld id="{30F0A286-0EF2-B54B-B349-D21AC9C8E548}" type="slidenum">
               <a:rPr lang="en-US" smtClean="0"/>
+              <a:pPr/>
               <a:t>‹#›</a:t>
             </a:fld>
             <a:endParaRPr lang="en-US"/>
@@ -1550,7 +1564,8 @@
           <a:p>
             <a:fld id="{71169BC0-758F-CD4F-A1C3-AB88916542BF}" type="datetimeFigureOut">
               <a:rPr lang="en-US" smtClean="0"/>
-              <a:t>2/7/15</a:t>
+              <a:pPr/>
+              <a:t>2/8/15</a:t>
             </a:fld>
             <a:endParaRPr lang="en-US"/>
           </a:p>
@@ -1592,6 +1607,7 @@
           <a:p>
             <a:fld id="{30F0A286-0EF2-B54B-B349-D21AC9C8E548}" type="slidenum">
               <a:rPr lang="en-US" smtClean="0"/>
+              <a:pPr/>
               <a:t>‹#›</a:t>
             </a:fld>
             <a:endParaRPr lang="en-US"/>
@@ -1833,7 +1849,8 @@
           <a:p>
             <a:fld id="{71169BC0-758F-CD4F-A1C3-AB88916542BF}" type="datetimeFigureOut">
               <a:rPr lang="en-US" smtClean="0"/>
-              <a:t>2/7/15</a:t>
+              <a:pPr/>
+              <a:t>2/8/15</a:t>
             </a:fld>
             <a:endParaRPr lang="en-US"/>
           </a:p>
@@ -1875,6 +1892,7 @@
           <a:p>
             <a:fld id="{30F0A286-0EF2-B54B-B349-D21AC9C8E548}" type="slidenum">
               <a:rPr lang="en-US" smtClean="0"/>
+              <a:pPr/>
               <a:t>‹#›</a:t>
             </a:fld>
             <a:endParaRPr lang="en-US"/>
@@ -2250,7 +2268,8 @@
           <a:p>
             <a:fld id="{71169BC0-758F-CD4F-A1C3-AB88916542BF}" type="datetimeFigureOut">
               <a:rPr lang="en-US" smtClean="0"/>
-              <a:t>2/7/15</a:t>
+              <a:pPr/>
+              <a:t>2/8/15</a:t>
             </a:fld>
             <a:endParaRPr lang="en-US"/>
           </a:p>
@@ -2292,6 +2311,7 @@
           <a:p>
             <a:fld id="{30F0A286-0EF2-B54B-B349-D21AC9C8E548}" type="slidenum">
               <a:rPr lang="en-US" smtClean="0"/>
+              <a:pPr/>
               <a:t>‹#›</a:t>
             </a:fld>
             <a:endParaRPr lang="en-US"/>
@@ -2363,7 +2383,8 @@
           <a:p>
             <a:fld id="{71169BC0-758F-CD4F-A1C3-AB88916542BF}" type="datetimeFigureOut">
               <a:rPr lang="en-US" smtClean="0"/>
-              <a:t>2/7/15</a:t>
+              <a:pPr/>
+              <a:t>2/8/15</a:t>
             </a:fld>
             <a:endParaRPr lang="en-US"/>
           </a:p>
@@ -2405,6 +2426,7 @@
           <a:p>
             <a:fld id="{30F0A286-0EF2-B54B-B349-D21AC9C8E548}" type="slidenum">
               <a:rPr lang="en-US" smtClean="0"/>
+              <a:pPr/>
               <a:t>‹#›</a:t>
             </a:fld>
             <a:endParaRPr lang="en-US"/>
@@ -2453,7 +2475,8 @@
           <a:p>
             <a:fld id="{71169BC0-758F-CD4F-A1C3-AB88916542BF}" type="datetimeFigureOut">
               <a:rPr lang="en-US" smtClean="0"/>
-              <a:t>2/7/15</a:t>
+              <a:pPr/>
+              <a:t>2/8/15</a:t>
             </a:fld>
             <a:endParaRPr lang="en-US"/>
           </a:p>
@@ -2495,6 +2518,7 @@
           <a:p>
             <a:fld id="{30F0A286-0EF2-B54B-B349-D21AC9C8E548}" type="slidenum">
               <a:rPr lang="en-US" smtClean="0"/>
+              <a:pPr/>
               <a:t>‹#›</a:t>
             </a:fld>
             <a:endParaRPr lang="en-US"/>
@@ -2725,7 +2749,8 @@
           <a:p>
             <a:fld id="{71169BC0-758F-CD4F-A1C3-AB88916542BF}" type="datetimeFigureOut">
               <a:rPr lang="en-US" smtClean="0"/>
-              <a:t>2/7/15</a:t>
+              <a:pPr/>
+              <a:t>2/8/15</a:t>
             </a:fld>
             <a:endParaRPr lang="en-US"/>
           </a:p>
@@ -2767,6 +2792,7 @@
           <a:p>
             <a:fld id="{30F0A286-0EF2-B54B-B349-D21AC9C8E548}" type="slidenum">
               <a:rPr lang="en-US" smtClean="0"/>
+              <a:pPr/>
               <a:t>‹#›</a:t>
             </a:fld>
             <a:endParaRPr lang="en-US"/>
@@ -2973,7 +2999,8 @@
           <a:p>
             <a:fld id="{71169BC0-758F-CD4F-A1C3-AB88916542BF}" type="datetimeFigureOut">
               <a:rPr lang="en-US" smtClean="0"/>
-              <a:t>2/7/15</a:t>
+              <a:pPr/>
+              <a:t>2/8/15</a:t>
             </a:fld>
             <a:endParaRPr lang="en-US"/>
           </a:p>
@@ -3015,6 +3042,7 @@
           <a:p>
             <a:fld id="{30F0A286-0EF2-B54B-B349-D21AC9C8E548}" type="slidenum">
               <a:rPr lang="en-US" smtClean="0"/>
+              <a:pPr/>
               <a:t>‹#›</a:t>
             </a:fld>
             <a:endParaRPr lang="en-US"/>
@@ -3181,7 +3209,8 @@
           <a:p>
             <a:fld id="{71169BC0-758F-CD4F-A1C3-AB88916542BF}" type="datetimeFigureOut">
               <a:rPr lang="en-US" smtClean="0"/>
-              <a:t>2/7/15</a:t>
+              <a:pPr/>
+              <a:t>2/8/15</a:t>
             </a:fld>
             <a:endParaRPr lang="en-US"/>
           </a:p>
@@ -3259,6 +3288,7 @@
           <a:p>
             <a:fld id="{30F0A286-0EF2-B54B-B349-D21AC9C8E548}" type="slidenum">
               <a:rPr lang="en-US" smtClean="0"/>
+              <a:pPr/>
               <a:t>‹#›</a:t>
             </a:fld>
             <a:endParaRPr lang="en-US"/>
@@ -3563,7 +3593,9 @@
         </p:nvSpPr>
         <p:spPr/>
         <p:txBody>
-          <a:bodyPr/>
+          <a:bodyPr>
+            <a:normAutofit/>
+          </a:bodyPr>
           <a:lstStyle/>
           <a:p>
             <a:r>
@@ -3580,35 +3612,88 @@
               </a:rPr>
               <a:t>Simulus</a:t>
             </a:r>
-            <a:endParaRPr lang="en-US" dirty="0">
-              <a:latin typeface="Helvetica"/>
-              <a:cs typeface="Helvetica"/>
-            </a:endParaRPr>
-          </a:p>
-        </p:txBody>
-      </p:sp>
-      <p:sp>
-        <p:nvSpPr>
-          <p:cNvPr id="3" name="Subtitle 2"/>
-          <p:cNvSpPr>
-            <a:spLocks noGrp="1"/>
-          </p:cNvSpPr>
-          <p:nvPr>
-            <p:ph type="subTitle" idx="1"/>
-          </p:nvPr>
-        </p:nvSpPr>
-        <p:spPr/>
-        <p:txBody>
-          <a:bodyPr/>
-          <a:lstStyle/>
-          <a:p>
             <a:r>
               <a:rPr lang="en-US" dirty="0" smtClean="0">
                 <a:latin typeface="Helvetica"/>
                 <a:cs typeface="Helvetica"/>
               </a:rPr>
-              <a:t>Traffic Simulation Software</a:t>
-            </a:r>
+              <a:t/>
+            </a:r>
+            <a:br>
+              <a:rPr lang="en-US" dirty="0" smtClean="0">
+                <a:latin typeface="Helvetica"/>
+                <a:cs typeface="Helvetica"/>
+              </a:rPr>
+            </a:br>
+            <a:r>
+              <a:rPr lang="en-US" sz="3200" dirty="0" smtClean="0">
+                <a:latin typeface="Helvetica"/>
+                <a:cs typeface="Helvetica"/>
+              </a:rPr>
+              <a:t>Traffic Simulation </a:t>
+            </a:r>
+            <a:r>
+              <a:rPr lang="en-US" sz="3200" dirty="0" smtClean="0">
+                <a:latin typeface="Helvetica"/>
+                <a:cs typeface="Helvetica"/>
+              </a:rPr>
+              <a:t>Project</a:t>
+            </a:r>
+            <a:endParaRPr lang="en-US" sz="3200" dirty="0">
+              <a:latin typeface="Helvetica"/>
+              <a:cs typeface="Helvetica"/>
+            </a:endParaRPr>
+          </a:p>
+        </p:txBody>
+      </p:sp>
+      <p:sp>
+        <p:nvSpPr>
+          <p:cNvPr id="3" name="Subtitle 2"/>
+          <p:cNvSpPr>
+            <a:spLocks noGrp="1"/>
+          </p:cNvSpPr>
+          <p:nvPr>
+            <p:ph type="subTitle" idx="1"/>
+          </p:nvPr>
+        </p:nvSpPr>
+        <p:spPr>
+          <a:xfrm>
+            <a:off x="1371600" y="4352678"/>
+            <a:ext cx="6400800" cy="1286121"/>
+          </a:xfrm>
+        </p:spPr>
+        <p:txBody>
+          <a:bodyPr/>
+          <a:lstStyle/>
+          <a:p>
+            <a:r>
+              <a:rPr lang="en-US" sz="2800" dirty="0" smtClean="0"/>
+              <a:t>King’s </a:t>
+            </a:r>
+            <a:r>
+              <a:rPr lang="en-US" sz="2800" dirty="0" smtClean="0"/>
+              <a:t>College London </a:t>
+            </a:r>
+          </a:p>
+          <a:p>
+            <a:r>
+              <a:rPr lang="en-US" sz="2800" i="1" dirty="0" smtClean="0"/>
+              <a:t>https://</a:t>
+            </a:r>
+            <a:r>
+              <a:rPr lang="en-US" sz="2800" i="1" dirty="0" err="1" smtClean="0"/>
+              <a:t>github.com/leorohr/simulus</a:t>
+            </a:r>
+            <a:r>
+              <a:rPr lang="en-US" sz="2800" i="1" dirty="0" smtClean="0"/>
+              <a:t> </a:t>
+            </a:r>
+          </a:p>
+          <a:p>
+            <a:endParaRPr lang="en-US" dirty="0" smtClean="0">
+              <a:latin typeface="Helvetica"/>
+              <a:cs typeface="Helvetica"/>
+            </a:endParaRPr>
           </a:p>
         </p:txBody>
       </p:sp>
@@ -3912,42 +3997,25 @@
           <a:p>
             <a:r>
               <a:rPr lang="en-US" dirty="0" smtClean="0"/>
-              <a:t>Project Description</a:t>
+              <a:t>Aims </a:t>
+            </a:r>
+            <a:r>
+              <a:rPr lang="en-US" dirty="0" smtClean="0"/>
+              <a:t>(</a:t>
+            </a:r>
+            <a:r>
+              <a:rPr lang="en-US" dirty="0" err="1" smtClean="0"/>
+              <a:t>MoSCoW</a:t>
+            </a:r>
+            <a:r>
+              <a:rPr lang="en-US" dirty="0" smtClean="0"/>
+              <a:t> Method</a:t>
+            </a:r>
+            <a:r>
+              <a:rPr lang="en-US" dirty="0" smtClean="0"/>
+              <a:t>) </a:t>
             </a:r>
             <a:endParaRPr lang="en-US" dirty="0"/>
-          </a:p>
-        </p:txBody>
-      </p:sp>
-      <p:sp>
-        <p:nvSpPr>
-          <p:cNvPr id="10" name="TextBox 9"/>
-          <p:cNvSpPr txBox="1"/>
-          <p:nvPr/>
-        </p:nvSpPr>
-        <p:spPr>
-          <a:xfrm>
-            <a:off x="685800" y="752606"/>
-            <a:ext cx="6160661" cy="446276"/>
-          </a:xfrm>
-          <a:prstGeom prst="rect">
-            <a:avLst/>
-          </a:prstGeom>
-          <a:noFill/>
-        </p:spPr>
-        <p:txBody>
-          <a:bodyPr vert="horz" wrap="square" rtlCol="0">
-            <a:spAutoFit/>
-          </a:bodyPr>
-          <a:lstStyle/>
-          <a:p>
-            <a:r>
-              <a:rPr lang="en-US" sz="2300" dirty="0" smtClean="0">
-                <a:latin typeface="Helvetica"/>
-                <a:cs typeface="Helvetica"/>
-              </a:rPr>
-              <a:t>Aims:</a:t>
-            </a:r>
-            <a:endParaRPr lang="en-US" sz="2000" dirty="0" smtClean="0"/>
           </a:p>
         </p:txBody>
       </p:sp>
@@ -3959,7 +4027,7 @@
         </p:nvSpPr>
         <p:spPr>
           <a:xfrm>
-            <a:off x="685800" y="1198883"/>
+            <a:off x="685802" y="855812"/>
             <a:ext cx="7404100" cy="1938992"/>
           </a:xfrm>
           <a:prstGeom prst="rect">
@@ -3973,16 +4041,13 @@
           </a:bodyPr>
           <a:lstStyle/>
           <a:p>
-            <a:pPr lvl="1">
-              <a:buFont typeface="Arial"/>
-              <a:buChar char="•"/>
-            </a:pPr>
+            <a:pPr lvl="1"/>
             <a:r>
               <a:rPr lang="en-US" sz="2000" dirty="0" smtClean="0">
                 <a:latin typeface="Helvetica"/>
                 <a:cs typeface="Helvetica"/>
               </a:rPr>
-              <a:t> Must</a:t>
+              <a:t>Must</a:t>
             </a:r>
           </a:p>
           <a:p>
@@ -4049,7 +4114,7 @@
         </p:nvSpPr>
         <p:spPr>
           <a:xfrm>
-            <a:off x="685800" y="3137875"/>
+            <a:off x="685802" y="2794804"/>
             <a:ext cx="7404100" cy="1015663"/>
           </a:xfrm>
           <a:prstGeom prst="rect">
@@ -4063,13 +4128,10 @@
           </a:bodyPr>
           <a:lstStyle/>
           <a:p>
-            <a:pPr lvl="1">
-              <a:buFont typeface="Arial"/>
-              <a:buChar char="•"/>
-            </a:pPr>
+            <a:pPr lvl="1"/>
             <a:r>
               <a:rPr lang="en-US" sz="2000" dirty="0" smtClean="0"/>
-              <a:t> Should</a:t>
+              <a:t>Should</a:t>
             </a:r>
           </a:p>
           <a:p>
@@ -4102,7 +4164,7 @@
         </p:nvSpPr>
         <p:spPr>
           <a:xfrm>
-            <a:off x="685799" y="4153538"/>
+            <a:off x="685801" y="3810467"/>
             <a:ext cx="7404101" cy="1015663"/>
           </a:xfrm>
           <a:prstGeom prst="rect">
@@ -4116,13 +4178,10 @@
           </a:bodyPr>
           <a:lstStyle/>
           <a:p>
-            <a:pPr lvl="1">
-              <a:buFont typeface="Arial"/>
-              <a:buChar char="•"/>
-            </a:pPr>
+            <a:pPr lvl="1"/>
             <a:r>
               <a:rPr lang="en-US" sz="2000" dirty="0" smtClean="0"/>
-              <a:t> Could</a:t>
+              <a:t>Could</a:t>
             </a:r>
           </a:p>
           <a:p>
@@ -4155,7 +4214,7 @@
         </p:nvSpPr>
         <p:spPr>
           <a:xfrm>
-            <a:off x="685798" y="5169201"/>
+            <a:off x="685800" y="4826130"/>
             <a:ext cx="7404101" cy="984885"/>
           </a:xfrm>
           <a:prstGeom prst="rect">
@@ -4169,13 +4228,10 @@
           </a:bodyPr>
           <a:lstStyle/>
           <a:p>
-            <a:pPr lvl="1">
-              <a:buFont typeface="Arial"/>
-              <a:buChar char="•"/>
-            </a:pPr>
+            <a:pPr lvl="1"/>
             <a:r>
               <a:rPr lang="en-US" sz="2000" dirty="0" smtClean="0"/>
-              <a:t> Won’t</a:t>
+              <a:t>Won’t</a:t>
             </a:r>
           </a:p>
           <a:p>
@@ -4232,7 +4288,7 @@
                                           </p:stCondLst>
                                         </p:cTn>
                                         <p:tgtEl>
-                                          <p:spTgt spid="10"/>
+                                          <p:spTgt spid="12"/>
                                         </p:tgtEl>
                                         <p:attrNameLst>
                                           <p:attrName>style.visibility</p:attrName>
@@ -4277,7 +4333,7 @@
                                           </p:stCondLst>
                                         </p:cTn>
                                         <p:tgtEl>
-                                          <p:spTgt spid="12"/>
+                                          <p:spTgt spid="13"/>
                                         </p:tgtEl>
                                         <p:attrNameLst>
                                           <p:attrName>style.visibility</p:attrName>
@@ -4322,7 +4378,7 @@
                                           </p:stCondLst>
                                         </p:cTn>
                                         <p:tgtEl>
-                                          <p:spTgt spid="13"/>
+                                          <p:spTgt spid="14"/>
                                         </p:tgtEl>
                                         <p:attrNameLst>
                                           <p:attrName>style.visibility</p:attrName>
@@ -4362,51 +4418,6 @@
                                     <p:set>
                                       <p:cBhvr>
                                         <p:cTn id="18" dur="1" fill="hold">
-                                          <p:stCondLst>
-                                            <p:cond delay="0"/>
-                                          </p:stCondLst>
-                                        </p:cTn>
-                                        <p:tgtEl>
-                                          <p:spTgt spid="14"/>
-                                        </p:tgtEl>
-                                        <p:attrNameLst>
-                                          <p:attrName>style.visibility</p:attrName>
-                                        </p:attrNameLst>
-                                      </p:cBhvr>
-                                      <p:to>
-                                        <p:strVal val="visible"/>
-                                      </p:to>
-                                    </p:set>
-                                  </p:childTnLst>
-                                </p:cTn>
-                              </p:par>
-                            </p:childTnLst>
-                          </p:cTn>
-                        </p:par>
-                      </p:childTnLst>
-                    </p:cTn>
-                  </p:par>
-                  <p:par>
-                    <p:cTn id="19" fill="hold">
-                      <p:stCondLst>
-                        <p:cond delay="indefinite"/>
-                      </p:stCondLst>
-                      <p:childTnLst>
-                        <p:par>
-                          <p:cTn id="20" fill="hold">
-                            <p:stCondLst>
-                              <p:cond delay="0"/>
-                            </p:stCondLst>
-                            <p:childTnLst>
-                              <p:par>
-                                <p:cTn id="21" presetID="1" presetClass="entr" presetSubtype="0" fill="hold" grpId="0" nodeType="clickEffect">
-                                  <p:stCondLst>
-                                    <p:cond delay="0"/>
-                                  </p:stCondLst>
-                                  <p:childTnLst>
-                                    <p:set>
-                                      <p:cBhvr>
-                                        <p:cTn id="22" dur="1" fill="hold">
                                           <p:stCondLst>
                                             <p:cond delay="0"/>
                                           </p:stCondLst>
@@ -4453,7 +4464,6 @@
       </p:par>
     </p:tnLst>
     <p:bldLst>
-      <p:bldP spid="10" grpId="0"/>
       <p:bldP spid="12" grpId="0"/>
       <p:bldP spid="13" grpId="0"/>
       <p:bldP spid="14" grpId="0"/>
@@ -4871,7 +4881,6 @@
               <a:rPr lang="en-US" sz="2000" dirty="0" smtClean="0"/>
               <a:t> Voice, Vote, Resolve</a:t>
             </a:r>
-            <a:endParaRPr lang="en-US" sz="2000" dirty="0" smtClean="0"/>
           </a:p>
         </p:txBody>
       </p:sp>
@@ -5343,6 +5352,426 @@
             <a:r>
               <a:rPr lang="en-US" dirty="0" smtClean="0"/>
               <a:t>Project Progress</a:t>
+            </a:r>
+            <a:endParaRPr lang="en-US" dirty="0"/>
+          </a:p>
+        </p:txBody>
+      </p:sp>
+      <p:pic>
+        <p:nvPicPr>
+          <p:cNvPr id="9" name="Picture 8" descr="gantt.png"/>
+          <p:cNvPicPr>
+            <a:picLocks noChangeAspect="1"/>
+          </p:cNvPicPr>
+          <p:nvPr/>
+        </p:nvPicPr>
+        <p:blipFill>
+          <a:blip r:embed="rId3"/>
+          <a:stretch>
+            <a:fillRect/>
+          </a:stretch>
+        </p:blipFill>
+        <p:spPr>
+          <a:xfrm>
+            <a:off x="902617" y="899039"/>
+            <a:ext cx="7316121" cy="5056138"/>
+          </a:xfrm>
+          <a:prstGeom prst="rect">
+            <a:avLst/>
+          </a:prstGeom>
+        </p:spPr>
+      </p:pic>
+    </p:spTree>
+  </p:cSld>
+  <p:clrMapOvr>
+    <a:masterClrMapping/>
+  </p:clrMapOvr>
+  <p:timing>
+    <p:tnLst>
+      <p:par>
+        <p:cTn id="1" dur="indefinite" restart="never" nodeType="tmRoot"/>
+      </p:par>
+    </p:tnLst>
+  </p:timing>
+</p:sld>
+</file>
+
+<file path=ppt/slides/slide5.xml><?xml version="1.0" encoding="utf-8"?>
+<p:sld xmlns:a="http://schemas.openxmlformats.org/drawingml/2006/main" xmlns:r="http://schemas.openxmlformats.org/officeDocument/2006/relationships" xmlns:mc="http://schemas.openxmlformats.org/markup-compatibility/2006" xmlns:mv="urn:schemas-microsoft-com:mac:vml" xmlns:p="http://schemas.openxmlformats.org/presentationml/2006/main" mc:Ignorable="mv" mc:PreserveAttributes="mv:*">
+  <p:cSld>
+    <p:spTree>
+      <p:nvGrpSpPr>
+        <p:cNvPr id="1" name=""/>
+        <p:cNvGrpSpPr/>
+        <p:nvPr/>
+      </p:nvGrpSpPr>
+      <p:grpSpPr>
+        <a:xfrm>
+          <a:off x="0" y="0"/>
+          <a:ext cx="0" cy="0"/>
+          <a:chOff x="0" y="0"/>
+          <a:chExt cx="0" cy="0"/>
+        </a:xfrm>
+      </p:grpSpPr>
+      <p:grpSp>
+        <p:nvGrpSpPr>
+          <p:cNvPr id="2" name="Group 7"/>
+          <p:cNvGrpSpPr/>
+          <p:nvPr/>
+        </p:nvGrpSpPr>
+        <p:grpSpPr>
+          <a:xfrm>
+            <a:off x="0" y="6168571"/>
+            <a:ext cx="9144000" cy="689429"/>
+            <a:chOff x="0" y="6168571"/>
+            <a:chExt cx="9144000" cy="689429"/>
+          </a:xfrm>
+        </p:grpSpPr>
+        <p:sp>
+          <p:nvSpPr>
+            <p:cNvPr id="7" name="Rectangle 6"/>
+            <p:cNvSpPr/>
+            <p:nvPr/>
+          </p:nvSpPr>
+          <p:spPr>
+            <a:xfrm>
+              <a:off x="0" y="6168571"/>
+              <a:ext cx="9144000" cy="689429"/>
+            </a:xfrm>
+            <a:prstGeom prst="rect">
+              <a:avLst/>
+            </a:prstGeom>
+            <a:solidFill>
+              <a:srgbClr val="15232D"/>
+            </a:solidFill>
+            <a:ln>
+              <a:noFill/>
+            </a:ln>
+          </p:spPr>
+          <p:style>
+            <a:lnRef idx="1">
+              <a:schemeClr val="accent1"/>
+            </a:lnRef>
+            <a:fillRef idx="3">
+              <a:schemeClr val="accent1"/>
+            </a:fillRef>
+            <a:effectRef idx="2">
+              <a:schemeClr val="accent1"/>
+            </a:effectRef>
+            <a:fontRef idx="minor">
+              <a:schemeClr val="lt1"/>
+            </a:fontRef>
+          </p:style>
+          <p:txBody>
+            <a:bodyPr rtlCol="0" anchor="ctr"/>
+            <a:lstStyle/>
+            <a:p>
+              <a:r>
+                <a:rPr lang="en-US" sz="1400" i="1" dirty="0" smtClean="0">
+                  <a:latin typeface="Helvetica"/>
+                  <a:cs typeface="Helvetica"/>
+                </a:rPr>
+                <a:t>7CCSMGPR</a:t>
+              </a:r>
+              <a:endParaRPr lang="en-US" sz="1400" i="1" dirty="0">
+                <a:latin typeface="Helvetica"/>
+                <a:cs typeface="Helvetica"/>
+              </a:endParaRPr>
+            </a:p>
+          </p:txBody>
+        </p:sp>
+        <p:pic>
+          <p:nvPicPr>
+            <p:cNvPr id="5" name="Picture 4" descr="simulus3.png"/>
+            <p:cNvPicPr>
+              <a:picLocks noChangeAspect="1"/>
+            </p:cNvPicPr>
+            <p:nvPr/>
+          </p:nvPicPr>
+          <p:blipFill>
+            <a:blip r:embed="rId2"/>
+            <a:srcRect l="17666" t="15596" r="19059" b="19266"/>
+            <a:stretch>
+              <a:fillRect/>
+            </a:stretch>
+          </p:blipFill>
+          <p:spPr>
+            <a:xfrm>
+              <a:off x="8089900" y="6213929"/>
+              <a:ext cx="1054100" cy="644071"/>
+            </a:xfrm>
+            <a:prstGeom prst="rect">
+              <a:avLst/>
+            </a:prstGeom>
+          </p:spPr>
+        </p:pic>
+      </p:grpSp>
+      <p:sp>
+        <p:nvSpPr>
+          <p:cNvPr id="6" name="TextBox 5"/>
+          <p:cNvSpPr txBox="1"/>
+          <p:nvPr/>
+        </p:nvSpPr>
+        <p:spPr>
+          <a:xfrm>
+            <a:off x="6368143" y="6168571"/>
+            <a:ext cx="184666" cy="369332"/>
+          </a:xfrm>
+          <a:prstGeom prst="rect">
+            <a:avLst/>
+          </a:prstGeom>
+          <a:noFill/>
+        </p:spPr>
+        <p:txBody>
+          <a:bodyPr wrap="none" rtlCol="0">
+            <a:spAutoFit/>
+          </a:bodyPr>
+          <a:lstStyle/>
+          <a:p>
+            <a:endParaRPr lang="en-US" dirty="0">
+              <a:latin typeface="Helvetica"/>
+              <a:cs typeface="Helvetica"/>
+            </a:endParaRPr>
+          </a:p>
+        </p:txBody>
+      </p:sp>
+      <p:sp>
+        <p:nvSpPr>
+          <p:cNvPr id="15" name="Title 7"/>
+          <p:cNvSpPr>
+            <a:spLocks noGrp="1"/>
+          </p:cNvSpPr>
+          <p:nvPr>
+            <p:ph type="ctrTitle"/>
+          </p:nvPr>
+        </p:nvSpPr>
+        <p:spPr>
+          <a:xfrm>
+            <a:off x="685800" y="17304"/>
+            <a:ext cx="7772400" cy="662214"/>
+          </a:xfrm>
+        </p:spPr>
+        <p:txBody>
+          <a:bodyPr>
+            <a:normAutofit fontScale="90000"/>
+          </a:bodyPr>
+          <a:lstStyle/>
+          <a:p>
+            <a:r>
+              <a:rPr lang="en-US" dirty="0" smtClean="0"/>
+              <a:t>Project</a:t>
+            </a:r>
+            <a:r>
+              <a:rPr lang="en-US" dirty="0" smtClean="0"/>
+              <a:t> Demonstration</a:t>
+            </a:r>
+            <a:endParaRPr lang="en-US" dirty="0"/>
+          </a:p>
+        </p:txBody>
+      </p:sp>
+      <p:pic>
+        <p:nvPicPr>
+          <p:cNvPr id="8" name="Picture 7" descr="screenshot.png"/>
+          <p:cNvPicPr>
+            <a:picLocks noChangeAspect="1"/>
+          </p:cNvPicPr>
+          <p:nvPr/>
+        </p:nvPicPr>
+        <p:blipFill>
+          <a:blip r:embed="rId3"/>
+          <a:stretch>
+            <a:fillRect/>
+          </a:stretch>
+        </p:blipFill>
+        <p:spPr>
+          <a:xfrm>
+            <a:off x="1509237" y="854743"/>
+            <a:ext cx="6221004" cy="5228764"/>
+          </a:xfrm>
+          <a:prstGeom prst="rect">
+            <a:avLst/>
+          </a:prstGeom>
+        </p:spPr>
+      </p:pic>
+    </p:spTree>
+  </p:cSld>
+  <p:clrMapOvr>
+    <a:masterClrMapping/>
+  </p:clrMapOvr>
+  <p:timing>
+    <p:tnLst>
+      <p:par>
+        <p:cTn id="1" dur="indefinite" restart="never" nodeType="tmRoot"/>
+      </p:par>
+    </p:tnLst>
+  </p:timing>
+</p:sld>
+</file>
+
+<file path=ppt/slides/slide6.xml><?xml version="1.0" encoding="utf-8"?>
+<p:sld xmlns:a="http://schemas.openxmlformats.org/drawingml/2006/main" xmlns:r="http://schemas.openxmlformats.org/officeDocument/2006/relationships" xmlns:mc="http://schemas.openxmlformats.org/markup-compatibility/2006" xmlns:mv="urn:schemas-microsoft-com:mac:vml" xmlns:p="http://schemas.openxmlformats.org/presentationml/2006/main" mc:Ignorable="mv" mc:PreserveAttributes="mv:*">
+  <p:cSld>
+    <p:spTree>
+      <p:nvGrpSpPr>
+        <p:cNvPr id="1" name=""/>
+        <p:cNvGrpSpPr/>
+        <p:nvPr/>
+      </p:nvGrpSpPr>
+      <p:grpSpPr>
+        <a:xfrm>
+          <a:off x="0" y="0"/>
+          <a:ext cx="0" cy="0"/>
+          <a:chOff x="0" y="0"/>
+          <a:chExt cx="0" cy="0"/>
+        </a:xfrm>
+      </p:grpSpPr>
+      <p:grpSp>
+        <p:nvGrpSpPr>
+          <p:cNvPr id="2" name="Group 7"/>
+          <p:cNvGrpSpPr/>
+          <p:nvPr/>
+        </p:nvGrpSpPr>
+        <p:grpSpPr>
+          <a:xfrm>
+            <a:off x="0" y="6168571"/>
+            <a:ext cx="9144000" cy="689429"/>
+            <a:chOff x="0" y="6168571"/>
+            <a:chExt cx="9144000" cy="689429"/>
+          </a:xfrm>
+        </p:grpSpPr>
+        <p:sp>
+          <p:nvSpPr>
+            <p:cNvPr id="7" name="Rectangle 6"/>
+            <p:cNvSpPr/>
+            <p:nvPr/>
+          </p:nvSpPr>
+          <p:spPr>
+            <a:xfrm>
+              <a:off x="0" y="6168571"/>
+              <a:ext cx="9144000" cy="689429"/>
+            </a:xfrm>
+            <a:prstGeom prst="rect">
+              <a:avLst/>
+            </a:prstGeom>
+            <a:solidFill>
+              <a:srgbClr val="15232D"/>
+            </a:solidFill>
+            <a:ln>
+              <a:noFill/>
+            </a:ln>
+          </p:spPr>
+          <p:style>
+            <a:lnRef idx="1">
+              <a:schemeClr val="accent1"/>
+            </a:lnRef>
+            <a:fillRef idx="3">
+              <a:schemeClr val="accent1"/>
+            </a:fillRef>
+            <a:effectRef idx="2">
+              <a:schemeClr val="accent1"/>
+            </a:effectRef>
+            <a:fontRef idx="minor">
+              <a:schemeClr val="lt1"/>
+            </a:fontRef>
+          </p:style>
+          <p:txBody>
+            <a:bodyPr rtlCol="0" anchor="ctr"/>
+            <a:lstStyle/>
+            <a:p>
+              <a:r>
+                <a:rPr lang="en-US" sz="1400" i="1" dirty="0" smtClean="0">
+                  <a:latin typeface="Helvetica"/>
+                  <a:cs typeface="Helvetica"/>
+                </a:rPr>
+                <a:t>7CCSMGPR</a:t>
+              </a:r>
+              <a:endParaRPr lang="en-US" sz="1400" i="1" dirty="0">
+                <a:latin typeface="Helvetica"/>
+                <a:cs typeface="Helvetica"/>
+              </a:endParaRPr>
+            </a:p>
+          </p:txBody>
+        </p:sp>
+        <p:pic>
+          <p:nvPicPr>
+            <p:cNvPr id="5" name="Picture 4" descr="simulus3.png"/>
+            <p:cNvPicPr>
+              <a:picLocks noChangeAspect="1"/>
+            </p:cNvPicPr>
+            <p:nvPr/>
+          </p:nvPicPr>
+          <p:blipFill>
+            <a:blip r:embed="rId2"/>
+            <a:srcRect l="17666" t="15596" r="19059" b="19266"/>
+            <a:stretch>
+              <a:fillRect/>
+            </a:stretch>
+          </p:blipFill>
+          <p:spPr>
+            <a:xfrm>
+              <a:off x="8089900" y="6213929"/>
+              <a:ext cx="1054100" cy="644071"/>
+            </a:xfrm>
+            <a:prstGeom prst="rect">
+              <a:avLst/>
+            </a:prstGeom>
+          </p:spPr>
+        </p:pic>
+      </p:grpSp>
+      <p:sp>
+        <p:nvSpPr>
+          <p:cNvPr id="6" name="TextBox 5"/>
+          <p:cNvSpPr txBox="1"/>
+          <p:nvPr/>
+        </p:nvSpPr>
+        <p:spPr>
+          <a:xfrm>
+            <a:off x="6368143" y="6168571"/>
+            <a:ext cx="184666" cy="369332"/>
+          </a:xfrm>
+          <a:prstGeom prst="rect">
+            <a:avLst/>
+          </a:prstGeom>
+          <a:noFill/>
+        </p:spPr>
+        <p:txBody>
+          <a:bodyPr wrap="none" rtlCol="0">
+            <a:spAutoFit/>
+          </a:bodyPr>
+          <a:lstStyle/>
+          <a:p>
+            <a:endParaRPr lang="en-US" dirty="0">
+              <a:latin typeface="Helvetica"/>
+              <a:cs typeface="Helvetica"/>
+            </a:endParaRPr>
+          </a:p>
+        </p:txBody>
+      </p:sp>
+      <p:sp>
+        <p:nvSpPr>
+          <p:cNvPr id="15" name="Title 7"/>
+          <p:cNvSpPr>
+            <a:spLocks noGrp="1"/>
+          </p:cNvSpPr>
+          <p:nvPr>
+            <p:ph type="ctrTitle"/>
+          </p:nvPr>
+        </p:nvSpPr>
+        <p:spPr>
+          <a:xfrm>
+            <a:off x="685800" y="17304"/>
+            <a:ext cx="7772400" cy="662214"/>
+          </a:xfrm>
+        </p:spPr>
+        <p:txBody>
+          <a:bodyPr>
+            <a:normAutofit fontScale="90000"/>
+          </a:bodyPr>
+          <a:lstStyle/>
+          <a:p>
+            <a:r>
+              <a:rPr lang="en-US" dirty="0" smtClean="0"/>
+              <a:t>Questions?</a:t>
             </a:r>
             <a:endParaRPr lang="en-US" dirty="0"/>
           </a:p>

</xml_diff>